<commit_message>
added report archived catalog files to excel task1 & excel task2 folder in June 24 folder
</commit_message>
<xml_diff>
--- a/24 June/EXCEL task2 documentation/EXCEL SCENARIO TASK2 documentation.pptx
+++ b/24 June/EXCEL task2 documentation/EXCEL SCENARIO TASK2 documentation.pptx
@@ -12,6 +12,7 @@
     <p:sldId id="260" r:id="rId6"/>
     <p:sldId id="261" r:id="rId7"/>
     <p:sldId id="263" r:id="rId8"/>
+    <p:sldId id="264" r:id="rId9"/>
   </p:sldIdLst>
   <p:sldSz cx="12192000" cy="6858000"/>
   <p:notesSz cx="6858000" cy="9144000"/>
@@ -3768,6 +3769,116 @@
           </a:p>
         </p:txBody>
       </p:sp>
+      <p:sp>
+        <p:nvSpPr>
+          <p:cNvPr id="4" name="Title 1">
+            <a:extLst>
+              <a:ext uri="{FF2B5EF4-FFF2-40B4-BE49-F238E27FC236}">
+                <a16:creationId xmlns:a16="http://schemas.microsoft.com/office/drawing/2014/main" id="{A114684A-B7EF-40AD-9013-A39724605DDD}"/>
+              </a:ext>
+            </a:extLst>
+          </p:cNvPr>
+          <p:cNvSpPr txBox="1">
+            <a:spLocks/>
+          </p:cNvSpPr>
+          <p:nvPr/>
+        </p:nvSpPr>
+        <p:spPr>
+          <a:xfrm>
+            <a:off x="838200" y="352246"/>
+            <a:ext cx="10515600" cy="1325563"/>
+          </a:xfrm>
+          <a:prstGeom prst="rect">
+            <a:avLst/>
+          </a:prstGeom>
+        </p:spPr>
+        <p:txBody>
+          <a:bodyPr vert="horz" lIns="91440" tIns="45720" rIns="91440" bIns="45720" rtlCol="0" anchor="ctr">
+            <a:normAutofit/>
+          </a:bodyPr>
+          <a:lstStyle>
+            <a:lvl1pPr algn="l" defTabSz="914400" rtl="0" eaLnBrk="1" latinLnBrk="0" hangingPunct="1">
+              <a:lnSpc>
+                <a:spcPct val="90000"/>
+              </a:lnSpc>
+              <a:spcBef>
+                <a:spcPct val="0"/>
+              </a:spcBef>
+              <a:buNone/>
+              <a:defRPr sz="4400" kern="1200">
+                <a:solidFill>
+                  <a:schemeClr val="tx1"/>
+                </a:solidFill>
+                <a:latin typeface="+mj-lt"/>
+                <a:ea typeface="+mj-ea"/>
+                <a:cs typeface="+mj-cs"/>
+              </a:defRPr>
+            </a:lvl1pPr>
+          </a:lstStyle>
+          <a:p>
+            <a:r>
+              <a:rPr lang="en-US"/>
+              <a:t>USING IF CONDITION </a:t>
+            </a:r>
+            <a:endParaRPr lang="en-US" dirty="0"/>
+          </a:p>
+        </p:txBody>
+      </p:sp>
+      <p:sp>
+        <p:nvSpPr>
+          <p:cNvPr id="5" name="Title 1">
+            <a:extLst>
+              <a:ext uri="{FF2B5EF4-FFF2-40B4-BE49-F238E27FC236}">
+                <a16:creationId xmlns:a16="http://schemas.microsoft.com/office/drawing/2014/main" id="{112C9D2A-14C8-491C-BBAB-B64FB8798AFD}"/>
+              </a:ext>
+            </a:extLst>
+          </p:cNvPr>
+          <p:cNvSpPr txBox="1">
+            <a:spLocks/>
+          </p:cNvSpPr>
+          <p:nvPr/>
+        </p:nvSpPr>
+        <p:spPr>
+          <a:xfrm>
+            <a:off x="838200" y="1015027"/>
+            <a:ext cx="9838898" cy="899118"/>
+          </a:xfrm>
+          <a:prstGeom prst="rect">
+            <a:avLst/>
+          </a:prstGeom>
+        </p:spPr>
+        <p:txBody>
+          <a:bodyPr vert="horz" lIns="91440" tIns="45720" rIns="91440" bIns="45720" rtlCol="0" anchor="ctr">
+            <a:normAutofit/>
+          </a:bodyPr>
+          <a:lstStyle>
+            <a:lvl1pPr algn="l" defTabSz="914400" rtl="0" eaLnBrk="1" latinLnBrk="0" hangingPunct="1">
+              <a:lnSpc>
+                <a:spcPct val="90000"/>
+              </a:lnSpc>
+              <a:spcBef>
+                <a:spcPct val="0"/>
+              </a:spcBef>
+              <a:buNone/>
+              <a:defRPr sz="4400" kern="1200">
+                <a:solidFill>
+                  <a:schemeClr val="tx1"/>
+                </a:solidFill>
+                <a:latin typeface="+mj-lt"/>
+                <a:ea typeface="+mj-ea"/>
+                <a:cs typeface="+mj-cs"/>
+              </a:defRPr>
+            </a:lvl1pPr>
+          </a:lstStyle>
+          <a:p>
+            <a:r>
+              <a:rPr lang="en-US" sz="3600"/>
+              <a:t>DEVELOPER:LEGACY TOOLS:TEXT FORM FIELD:CODE</a:t>
+            </a:r>
+            <a:endParaRPr lang="en-US" sz="3600" dirty="0"/>
+          </a:p>
+        </p:txBody>
+      </p:sp>
     </p:spTree>
     <p:extLst>
       <p:ext uri="{BB962C8B-B14F-4D97-AF65-F5344CB8AC3E}">
@@ -4153,23 +4264,246 @@
       </p:grpSpPr>
       <p:sp>
         <p:nvSpPr>
-          <p:cNvPr id="3" name="Content Placeholder 2">
-            <a:extLst>
-              <a:ext uri="{FF2B5EF4-FFF2-40B4-BE49-F238E27FC236}">
-                <a16:creationId xmlns:a16="http://schemas.microsoft.com/office/drawing/2014/main" id="{4AF79219-E543-4536-8FB4-30C89D6470A5}"/>
-              </a:ext>
-            </a:extLst>
-          </p:cNvPr>
-          <p:cNvSpPr>
-            <a:spLocks noGrp="1"/>
-          </p:cNvSpPr>
-          <p:nvPr>
-            <p:ph idx="1"/>
-          </p:nvPr>
+          <p:cNvPr id="2" name="TextBox 1">
+            <a:extLst>
+              <a:ext uri="{FF2B5EF4-FFF2-40B4-BE49-F238E27FC236}">
+                <a16:creationId xmlns:a16="http://schemas.microsoft.com/office/drawing/2014/main" id="{95F33FA2-2D8D-45E3-8FBB-23A16F4F952D}"/>
+              </a:ext>
+            </a:extLst>
+          </p:cNvPr>
+          <p:cNvSpPr txBox="1"/>
+          <p:nvPr/>
         </p:nvSpPr>
         <p:spPr>
           <a:xfrm>
-            <a:off x="554865" y="859710"/>
+            <a:off x="798490" y="1468192"/>
+            <a:ext cx="10515600" cy="4524315"/>
+          </a:xfrm>
+          <a:prstGeom prst="rect">
+            <a:avLst/>
+          </a:prstGeom>
+          <a:noFill/>
+        </p:spPr>
+        <p:txBody>
+          <a:bodyPr wrap="square" rtlCol="0">
+            <a:spAutoFit/>
+          </a:bodyPr>
+          <a:lstStyle/>
+          <a:p>
+            <a:pPr marL="285750" indent="-285750">
+              <a:buFont typeface="Arial" panose="020B0604020202020204" pitchFamily="34" charset="0"/>
+              <a:buChar char="•"/>
+            </a:pPr>
+            <a:r>
+              <a:rPr lang="en-US" dirty="0"/>
+              <a:t>CREATE DM WITH PARAMETER  AS BU(HARDCODED).</a:t>
+            </a:r>
+          </a:p>
+          <a:p>
+            <a:pPr marL="285750" indent="-285750">
+              <a:buFont typeface="Arial" panose="020B0604020202020204" pitchFamily="34" charset="0"/>
+              <a:buChar char="•"/>
+            </a:pPr>
+            <a:r>
+              <a:rPr lang="en-US" dirty="0"/>
+              <a:t>EXPORT DM &amp; UPLOAD TO MS Word.</a:t>
+            </a:r>
+          </a:p>
+          <a:p>
+            <a:pPr marL="285750" indent="-285750">
+              <a:buFont typeface="Arial" panose="020B0604020202020204" pitchFamily="34" charset="0"/>
+              <a:buChar char="•"/>
+            </a:pPr>
+            <a:r>
+              <a:rPr lang="en-US" dirty="0"/>
+              <a:t>SAVE AS RTF TEMPLATE  AND THEN ADD DIFF LAYOUT FOR ALL BU’s.</a:t>
+            </a:r>
+          </a:p>
+          <a:p>
+            <a:pPr marL="285750" indent="-285750">
+              <a:buFont typeface="Arial" panose="020B0604020202020204" pitchFamily="34" charset="0"/>
+              <a:buChar char="•"/>
+            </a:pPr>
+            <a:r>
+              <a:rPr lang="en-US" dirty="0"/>
+              <a:t>ADD IF CONDITIONAL,FOR-EACH,FOR-EACH-GROUP,PAGEBREAK.</a:t>
+            </a:r>
+          </a:p>
+          <a:p>
+            <a:pPr marL="285750" indent="-285750">
+              <a:buFont typeface="Arial" panose="020B0604020202020204" pitchFamily="34" charset="0"/>
+              <a:buChar char="•"/>
+            </a:pPr>
+            <a:r>
+              <a:rPr lang="en-US" dirty="0"/>
+              <a:t>GOTO BI Publisher AND CLICK Excel Preview.</a:t>
+            </a:r>
+          </a:p>
+          <a:p>
+            <a:pPr marL="285750" indent="-285750">
+              <a:buFont typeface="Arial" panose="020B0604020202020204" pitchFamily="34" charset="0"/>
+              <a:buChar char="•"/>
+            </a:pPr>
+            <a:r>
+              <a:rPr lang="en-US" dirty="0"/>
+              <a:t>THEN VERIFY OUTPUT DATE FOR ALL BU’s.</a:t>
+            </a:r>
+          </a:p>
+          <a:p>
+            <a:pPr marL="285750" indent="-285750">
+              <a:buFont typeface="Arial" panose="020B0604020202020204" pitchFamily="34" charset="0"/>
+              <a:buChar char="•"/>
+            </a:pPr>
+            <a:r>
+              <a:rPr lang="en-US" dirty="0"/>
+              <a:t>ATLAST, GOTO ORACLE INSTANCE CREATE REPORT FOR DATAMODEL.</a:t>
+            </a:r>
+          </a:p>
+          <a:p>
+            <a:pPr marL="285750" indent="-285750">
+              <a:buFont typeface="Arial" panose="020B0604020202020204" pitchFamily="34" charset="0"/>
+              <a:buChar char="•"/>
+            </a:pPr>
+            <a:r>
+              <a:rPr lang="en-US" dirty="0"/>
+              <a:t>UPLOAD THE RTF TEMPLATE.</a:t>
+            </a:r>
+          </a:p>
+          <a:p>
+            <a:pPr marL="285750" indent="-285750">
+              <a:buFont typeface="Arial" panose="020B0604020202020204" pitchFamily="34" charset="0"/>
+              <a:buChar char="•"/>
+            </a:pPr>
+            <a:r>
+              <a:rPr lang="en-US" dirty="0"/>
+              <a:t>SELECT BU’s to ALL or any required BU(SUCH AS UK Business Unit,US1 Business Unit, France Business Unit, China Business Unit).</a:t>
+            </a:r>
+          </a:p>
+          <a:p>
+            <a:pPr marL="285750" indent="-285750">
+              <a:buFont typeface="Arial" panose="020B0604020202020204" pitchFamily="34" charset="0"/>
+              <a:buChar char="•"/>
+            </a:pPr>
+            <a:r>
+              <a:rPr lang="en-US" dirty="0"/>
+              <a:t>THEN CLICK THE SETTINGS ICON AT THE TOP RIGHT CORNER AND CLICK EXPORT REPORT OPTIONS AND SELECT Excel(.xlsx) FORMAT.</a:t>
+            </a:r>
+          </a:p>
+          <a:p>
+            <a:pPr marL="285750" indent="-285750">
+              <a:buFont typeface="Arial" panose="020B0604020202020204" pitchFamily="34" charset="0"/>
+              <a:buChar char="•"/>
+            </a:pPr>
+            <a:r>
+              <a:rPr lang="en-US" dirty="0"/>
+              <a:t>OUTPUT FILE BE AUTOMATICALLY GENERATED BY ORACLE and IT WILL BE IN DOWNLOADS FOLDER. </a:t>
+            </a:r>
+          </a:p>
+          <a:p>
+            <a:pPr marL="285750" indent="-285750">
+              <a:buFont typeface="Arial" panose="020B0604020202020204" pitchFamily="34" charset="0"/>
+              <a:buChar char="•"/>
+            </a:pPr>
+            <a:endParaRPr lang="en-US" dirty="0"/>
+          </a:p>
+          <a:p>
+            <a:pPr marL="285750" indent="-285750">
+              <a:buFont typeface="Arial" panose="020B0604020202020204" pitchFamily="34" charset="0"/>
+              <a:buChar char="•"/>
+            </a:pPr>
+            <a:endParaRPr lang="en-US" dirty="0"/>
+          </a:p>
+          <a:p>
+            <a:pPr marL="285750" indent="-285750">
+              <a:buFont typeface="Arial" panose="020B0604020202020204" pitchFamily="34" charset="0"/>
+              <a:buChar char="•"/>
+            </a:pPr>
+            <a:endParaRPr lang="en-US" dirty="0"/>
+          </a:p>
+        </p:txBody>
+      </p:sp>
+      <p:sp>
+        <p:nvSpPr>
+          <p:cNvPr id="4" name="Title 1">
+            <a:extLst>
+              <a:ext uri="{FF2B5EF4-FFF2-40B4-BE49-F238E27FC236}">
+                <a16:creationId xmlns:a16="http://schemas.microsoft.com/office/drawing/2014/main" id="{848DE655-DD5A-49D9-8F8A-8963DE1E36FA}"/>
+              </a:ext>
+            </a:extLst>
+          </p:cNvPr>
+          <p:cNvSpPr>
+            <a:spLocks noGrp="1"/>
+          </p:cNvSpPr>
+          <p:nvPr>
+            <p:ph type="title"/>
+          </p:nvPr>
+        </p:nvSpPr>
+        <p:spPr>
+          <a:xfrm>
+            <a:off x="750627" y="231478"/>
+            <a:ext cx="8842612" cy="899118"/>
+          </a:xfrm>
+        </p:spPr>
+        <p:txBody>
+          <a:bodyPr/>
+          <a:lstStyle/>
+          <a:p>
+            <a:r>
+              <a:rPr lang="en-US" dirty="0"/>
+              <a:t>HINT TO SOLUTION</a:t>
+            </a:r>
+          </a:p>
+        </p:txBody>
+      </p:sp>
+    </p:spTree>
+    <p:extLst>
+      <p:ext uri="{BB962C8B-B14F-4D97-AF65-F5344CB8AC3E}">
+        <p14:creationId xmlns:p14="http://schemas.microsoft.com/office/powerpoint/2010/main" val="2036412739"/>
+      </p:ext>
+    </p:extLst>
+  </p:cSld>
+  <p:clrMapOvr>
+    <a:masterClrMapping/>
+  </p:clrMapOvr>
+</p:sld>
+</file>
+
+<file path=ppt/slides/slide8.xml><?xml version="1.0" encoding="utf-8"?>
+<p:sld xmlns:a="http://schemas.openxmlformats.org/drawingml/2006/main" xmlns:r="http://schemas.openxmlformats.org/officeDocument/2006/relationships" xmlns:p="http://schemas.openxmlformats.org/presentationml/2006/main">
+  <p:cSld>
+    <p:spTree>
+      <p:nvGrpSpPr>
+        <p:cNvPr id="1" name=""/>
+        <p:cNvGrpSpPr/>
+        <p:nvPr/>
+      </p:nvGrpSpPr>
+      <p:grpSpPr>
+        <a:xfrm>
+          <a:off x="0" y="0"/>
+          <a:ext cx="0" cy="0"/>
+          <a:chOff x="0" y="0"/>
+          <a:chExt cx="0" cy="0"/>
+        </a:xfrm>
+      </p:grpSpPr>
+      <p:sp>
+        <p:nvSpPr>
+          <p:cNvPr id="4" name="Content Placeholder 2">
+            <a:extLst>
+              <a:ext uri="{FF2B5EF4-FFF2-40B4-BE49-F238E27FC236}">
+                <a16:creationId xmlns:a16="http://schemas.microsoft.com/office/drawing/2014/main" id="{2C914522-4BD5-4A39-8107-070D44F3DC53}"/>
+              </a:ext>
+            </a:extLst>
+          </p:cNvPr>
+          <p:cNvSpPr>
+            <a:spLocks noGrp="1"/>
+          </p:cNvSpPr>
+          <p:nvPr>
+            <p:ph idx="1"/>
+          </p:nvPr>
+        </p:nvSpPr>
+        <p:spPr>
+          <a:xfrm>
+            <a:off x="670775" y="936983"/>
             <a:ext cx="10515600" cy="4351338"/>
           </a:xfrm>
         </p:spPr>
@@ -4193,7 +4527,7 @@
     </p:spTree>
     <p:extLst>
       <p:ext uri="{BB962C8B-B14F-4D97-AF65-F5344CB8AC3E}">
-        <p14:creationId xmlns:p14="http://schemas.microsoft.com/office/powerpoint/2010/main" val="2036412739"/>
+        <p14:creationId xmlns:p14="http://schemas.microsoft.com/office/powerpoint/2010/main" val="1721929369"/>
       </p:ext>
     </p:extLst>
   </p:cSld>

</xml_diff>